<commit_message>
Update README with annotation pipeline
</commit_message>
<xml_diff>
--- a/Chessboard Detection Pipeline.pptx
+++ b/Chessboard Detection Pipeline.pptx
@@ -6,6 +6,7 @@
   </p:sldMasterIdLst>
   <p:sldIdLst>
     <p:sldId id="3758" r:id="rId2"/>
+    <p:sldId id="3759" r:id="rId3"/>
   </p:sldIdLst>
   <p:sldSz cx="12192000" cy="6858000"/>
   <p:notesSz cx="6858000" cy="9144000"/>
@@ -104,6 +105,11 @@
       </a:defRPr>
     </a:lvl9pPr>
   </p:defaultTextStyle>
+  <p:extLst>
+    <p:ext uri="{EFAFB233-063F-42B5-8137-9DF3F51BA10A}">
+      <p15:sldGuideLst xmlns:p15="http://schemas.microsoft.com/office/powerpoint/2012/main"/>
+    </p:ext>
+  </p:extLst>
 </p:presentation>
 </file>
 
@@ -24491,6 +24497,837 @@
 </p:sld>
 </file>
 
+<file path=ppt/slides/slide2.xml><?xml version="1.0" encoding="utf-8"?>
+<p:sld xmlns:a="http://schemas.openxmlformats.org/drawingml/2006/main" xmlns:r="http://schemas.openxmlformats.org/officeDocument/2006/relationships" xmlns:p="http://schemas.openxmlformats.org/presentationml/2006/main">
+  <p:cSld>
+    <p:spTree>
+      <p:nvGrpSpPr>
+        <p:cNvPr id="1" name="">
+          <a:extLst>
+            <a:ext uri="{FF2B5EF4-FFF2-40B4-BE49-F238E27FC236}">
+              <a16:creationId xmlns:a16="http://schemas.microsoft.com/office/drawing/2014/main" id="{0E684703-8EC9-0AAC-2189-8610081C3288}"/>
+            </a:ext>
+          </a:extLst>
+        </p:cNvPr>
+        <p:cNvGrpSpPr/>
+        <p:nvPr/>
+      </p:nvGrpSpPr>
+      <p:grpSpPr>
+        <a:xfrm>
+          <a:off x="0" y="0"/>
+          <a:ext cx="0" cy="0"/>
+          <a:chOff x="0" y="0"/>
+          <a:chExt cx="0" cy="0"/>
+        </a:xfrm>
+      </p:grpSpPr>
+      <p:graphicFrame>
+        <p:nvGraphicFramePr>
+          <p:cNvPr id="6" name="think-cell data - do not delete" hidden="1">
+            <a:extLst>
+              <a:ext uri="{FF2B5EF4-FFF2-40B4-BE49-F238E27FC236}">
+                <a16:creationId xmlns:a16="http://schemas.microsoft.com/office/drawing/2014/main" id="{CC56B3E1-FD36-891F-E9A3-8E982DABC489}"/>
+              </a:ext>
+            </a:extLst>
+          </p:cNvPr>
+          <p:cNvGraphicFramePr>
+            <a:graphicFrameLocks noChangeAspect="1"/>
+          </p:cNvGraphicFramePr>
+          <p:nvPr>
+            <p:custDataLst>
+              <p:tags r:id="rId1"/>
+            </p:custDataLst>
+            <p:extLst>
+              <p:ext uri="{D42A27DB-BD31-4B8C-83A1-F6EECF244321}">
+                <p14:modId xmlns:p14="http://schemas.microsoft.com/office/powerpoint/2010/main" val="3281340111"/>
+              </p:ext>
+            </p:extLst>
+          </p:nvPr>
+        </p:nvGraphicFramePr>
+        <p:xfrm>
+          <a:off x="1588" y="1588"/>
+          <a:ext cx="1588" cy="1588"/>
+        </p:xfrm>
+        <a:graphic>
+          <a:graphicData uri="http://schemas.openxmlformats.org/presentationml/2006/ole">
+            <mc:AlternateContent xmlns:mc="http://schemas.openxmlformats.org/markup-compatibility/2006">
+              <mc:Choice xmlns:v="urn:schemas-microsoft-com:vml" Requires="v">
+                <p:oleObj name="think-cell Slide" r:id="rId3" imgW="425" imgH="424" progId="TCLayout.ActiveDocument.1">
+                  <p:embed/>
+                </p:oleObj>
+              </mc:Choice>
+              <mc:Fallback>
+                <p:oleObj name="think-cell Slide" r:id="rId3" imgW="425" imgH="424" progId="TCLayout.ActiveDocument.1">
+                  <p:embed/>
+                  <p:pic>
+                    <p:nvPicPr>
+                      <p:cNvPr id="6" name="think-cell data - do not delete" hidden="1">
+                        <a:extLst>
+                          <a:ext uri="{FF2B5EF4-FFF2-40B4-BE49-F238E27FC236}">
+                            <a16:creationId xmlns:a16="http://schemas.microsoft.com/office/drawing/2014/main" id="{F7A3B790-4FC4-32B0-227F-8B4E23E5AAE1}"/>
+                          </a:ext>
+                        </a:extLst>
+                      </p:cNvPr>
+                      <p:cNvPicPr/>
+                      <p:nvPr/>
+                    </p:nvPicPr>
+                    <p:blipFill>
+                      <a:blip r:embed="rId4"/>
+                      <a:stretch>
+                        <a:fillRect/>
+                      </a:stretch>
+                    </p:blipFill>
+                    <p:spPr>
+                      <a:xfrm>
+                        <a:off x="1588" y="1588"/>
+                        <a:ext cx="1588" cy="1588"/>
+                      </a:xfrm>
+                      <a:prstGeom prst="rect">
+                        <a:avLst/>
+                      </a:prstGeom>
+                    </p:spPr>
+                  </p:pic>
+                </p:oleObj>
+              </mc:Fallback>
+            </mc:AlternateContent>
+          </a:graphicData>
+        </a:graphic>
+      </p:graphicFrame>
+      <p:sp>
+        <p:nvSpPr>
+          <p:cNvPr id="2" name="Title 1">
+            <a:extLst>
+              <a:ext uri="{FF2B5EF4-FFF2-40B4-BE49-F238E27FC236}">
+                <a16:creationId xmlns:a16="http://schemas.microsoft.com/office/drawing/2014/main" id="{ACF1920E-F1EC-2202-494C-E14090EFDC4D}"/>
+              </a:ext>
+            </a:extLst>
+          </p:cNvPr>
+          <p:cNvSpPr>
+            <a:spLocks noGrp="1"/>
+          </p:cNvSpPr>
+          <p:nvPr>
+            <p:ph type="title"/>
+          </p:nvPr>
+        </p:nvSpPr>
+        <p:spPr>
+          <a:xfrm>
+            <a:off x="554736" y="-154781"/>
+            <a:ext cx="11082528" cy="731520"/>
+          </a:xfrm>
+        </p:spPr>
+        <p:txBody>
+          <a:bodyPr vert="horz"/>
+          <a:lstStyle/>
+          <a:p>
+            <a:r>
+              <a:rPr lang="en-GB" dirty="0"/>
+              <a:t>Chessboard Annotation Pipeline</a:t>
+            </a:r>
+          </a:p>
+        </p:txBody>
+      </p:sp>
+      <p:sp>
+        <p:nvSpPr>
+          <p:cNvPr id="4" name="Text Placeholder 3">
+            <a:extLst>
+              <a:ext uri="{FF2B5EF4-FFF2-40B4-BE49-F238E27FC236}">
+                <a16:creationId xmlns:a16="http://schemas.microsoft.com/office/drawing/2014/main" id="{1FC66DE6-BA83-A0C9-1CF8-ED34AB15DAD4}"/>
+              </a:ext>
+            </a:extLst>
+          </p:cNvPr>
+          <p:cNvSpPr>
+            <a:spLocks noGrp="1"/>
+          </p:cNvSpPr>
+          <p:nvPr>
+            <p:ph type="body" sz="quarter" idx="17"/>
+          </p:nvPr>
+        </p:nvSpPr>
+        <p:spPr/>
+        <p:txBody>
+          <a:bodyPr/>
+          <a:lstStyle/>
+          <a:p>
+            <a:endParaRPr lang="en-GB"/>
+          </a:p>
+        </p:txBody>
+      </p:sp>
+      <p:sp>
+        <p:nvSpPr>
+          <p:cNvPr id="3" name="Subtitle 2">
+            <a:extLst>
+              <a:ext uri="{FF2B5EF4-FFF2-40B4-BE49-F238E27FC236}">
+                <a16:creationId xmlns:a16="http://schemas.microsoft.com/office/drawing/2014/main" id="{98EDE22A-2256-C7AE-BD62-A34D55AFEAE5}"/>
+              </a:ext>
+            </a:extLst>
+          </p:cNvPr>
+          <p:cNvSpPr>
+            <a:spLocks noGrp="1"/>
+          </p:cNvSpPr>
+          <p:nvPr>
+            <p:ph type="subTitle" idx="1"/>
+          </p:nvPr>
+        </p:nvSpPr>
+        <p:spPr>
+          <a:xfrm>
+            <a:off x="554736" y="762167"/>
+            <a:ext cx="11082528" cy="276999"/>
+          </a:xfrm>
+        </p:spPr>
+        <p:txBody>
+          <a:bodyPr/>
+          <a:lstStyle/>
+          <a:p>
+            <a:r>
+              <a:rPr lang="en-GB" baseline="30000" dirty="0">
+                <a:latin typeface="Arial Headings"/>
+              </a:rPr>
+              <a:t>Pipeline created to quicken the chessboard annotation process and have the right format for each cell (as opposed to screenshot).</a:t>
+            </a:r>
+            <a:endParaRPr lang="en-GB" sz="1600" baseline="30000" dirty="0">
+              <a:latin typeface="Arial Headings"/>
+            </a:endParaRPr>
+          </a:p>
+        </p:txBody>
+      </p:sp>
+      <p:pic>
+        <p:nvPicPr>
+          <p:cNvPr id="8" name="Graphic 7" descr="Gears with solid fill">
+            <a:extLst>
+              <a:ext uri="{FF2B5EF4-FFF2-40B4-BE49-F238E27FC236}">
+                <a16:creationId xmlns:a16="http://schemas.microsoft.com/office/drawing/2014/main" id="{F5A6B4F7-1053-1F50-E489-20119CF09BFD}"/>
+              </a:ext>
+            </a:extLst>
+          </p:cNvPr>
+          <p:cNvPicPr>
+            <a:picLocks noChangeAspect="1"/>
+          </p:cNvPicPr>
+          <p:nvPr/>
+        </p:nvPicPr>
+        <p:blipFill>
+          <a:blip r:embed="rId5">
+            <a:extLst>
+              <a:ext uri="{96DAC541-7B7A-43D3-8B79-37D633B846F1}">
+                <asvg:svgBlip xmlns:asvg="http://schemas.microsoft.com/office/drawing/2016/SVG/main" r:embed="rId6"/>
+              </a:ext>
+            </a:extLst>
+          </a:blip>
+          <a:stretch>
+            <a:fillRect/>
+          </a:stretch>
+        </p:blipFill>
+        <p:spPr>
+          <a:xfrm>
+            <a:off x="4656787" y="1733802"/>
+            <a:ext cx="420554" cy="420554"/>
+          </a:xfrm>
+          <a:prstGeom prst="rect">
+            <a:avLst/>
+          </a:prstGeom>
+        </p:spPr>
+      </p:pic>
+      <p:sp>
+        <p:nvSpPr>
+          <p:cNvPr id="51" name="TextBox 50">
+            <a:extLst>
+              <a:ext uri="{FF2B5EF4-FFF2-40B4-BE49-F238E27FC236}">
+                <a16:creationId xmlns:a16="http://schemas.microsoft.com/office/drawing/2014/main" id="{262365AD-B0B6-3904-C9E8-34C34FC4E4A0}"/>
+              </a:ext>
+            </a:extLst>
+          </p:cNvPr>
+          <p:cNvSpPr txBox="1"/>
+          <p:nvPr/>
+        </p:nvSpPr>
+        <p:spPr>
+          <a:xfrm>
+            <a:off x="155914" y="6402055"/>
+            <a:ext cx="3106941" cy="369332"/>
+          </a:xfrm>
+          <a:prstGeom prst="rect">
+            <a:avLst/>
+          </a:prstGeom>
+          <a:noFill/>
+        </p:spPr>
+        <p:txBody>
+          <a:bodyPr wrap="none" rtlCol="0">
+            <a:spAutoFit/>
+          </a:bodyPr>
+          <a:lstStyle/>
+          <a:p>
+            <a:pPr marL="0" marR="0" lvl="0" indent="0" algn="l" defTabSz="914400" rtl="0" eaLnBrk="1" fontAlgn="auto" latinLnBrk="0" hangingPunct="1">
+              <a:lnSpc>
+                <a:spcPct val="100000"/>
+              </a:lnSpc>
+              <a:spcBef>
+                <a:spcPts val="0"/>
+              </a:spcBef>
+              <a:spcAft>
+                <a:spcPts val="0"/>
+              </a:spcAft>
+              <a:buClrTx/>
+              <a:buSzTx/>
+              <a:buFontTx/>
+              <a:buNone/>
+              <a:tabLst/>
+              <a:defRPr/>
+            </a:pPr>
+            <a:r>
+              <a:rPr kumimoji="0" lang="fr-FR" sz="900" b="0" i="1" u="none" strike="noStrike" kern="1200" cap="none" spc="0" normalizeH="0" baseline="0" noProof="0" dirty="0">
+                <a:ln>
+                  <a:noFill/>
+                </a:ln>
+                <a:solidFill>
+                  <a:srgbClr val="000000"/>
+                </a:solidFill>
+                <a:effectLst/>
+                <a:uLnTx/>
+                <a:uFillTx/>
+                <a:latin typeface="Arial"/>
+                <a:ea typeface="+mn-ea"/>
+                <a:cs typeface="+mn-cs"/>
+              </a:rPr>
+              <a:t>Note:</a:t>
+            </a:r>
+          </a:p>
+          <a:p>
+            <a:pPr marL="0" marR="0" lvl="0" indent="0" algn="l" defTabSz="914400" rtl="0" eaLnBrk="1" fontAlgn="auto" latinLnBrk="0" hangingPunct="1">
+              <a:lnSpc>
+                <a:spcPct val="100000"/>
+              </a:lnSpc>
+              <a:spcBef>
+                <a:spcPts val="0"/>
+              </a:spcBef>
+              <a:spcAft>
+                <a:spcPts val="0"/>
+              </a:spcAft>
+              <a:buClrTx/>
+              <a:buSzTx/>
+              <a:buFontTx/>
+              <a:buNone/>
+              <a:tabLst/>
+              <a:defRPr/>
+            </a:pPr>
+            <a:r>
+              <a:rPr kumimoji="0" lang="fr-FR" sz="900" b="0" i="1" u="none" strike="noStrike" kern="1200" cap="none" spc="0" normalizeH="0" baseline="30000" noProof="0" dirty="0">
+                <a:ln>
+                  <a:noFill/>
+                </a:ln>
+                <a:solidFill>
+                  <a:srgbClr val="000000"/>
+                </a:solidFill>
+                <a:effectLst/>
+                <a:uLnTx/>
+                <a:uFillTx/>
+                <a:latin typeface="Arial"/>
+                <a:ea typeface="+mn-ea"/>
+                <a:cs typeface="+mn-cs"/>
+              </a:rPr>
+              <a:t>(1)</a:t>
+            </a:r>
+            <a:r>
+              <a:rPr kumimoji="0" lang="fr-FR" sz="900" b="0" i="1" u="none" strike="noStrike" kern="1200" cap="none" spc="0" normalizeH="0" baseline="0" noProof="0" dirty="0">
+                <a:ln>
+                  <a:noFill/>
+                </a:ln>
+                <a:solidFill>
+                  <a:srgbClr val="000000"/>
+                </a:solidFill>
+                <a:effectLst/>
+                <a:uLnTx/>
+                <a:uFillTx/>
+                <a:latin typeface="Arial"/>
+                <a:ea typeface="+mn-ea"/>
+                <a:cs typeface="+mn-cs"/>
+              </a:rPr>
+              <a:t> Source: </a:t>
+            </a:r>
+            <a:r>
+              <a:rPr kumimoji="0" lang="en-US" sz="900" b="0" i="1" u="none" strike="noStrike" kern="1200" cap="none" spc="0" normalizeH="0" baseline="0" noProof="0" dirty="0" err="1">
+                <a:ln>
+                  <a:noFill/>
+                </a:ln>
+                <a:solidFill>
+                  <a:srgbClr val="000000"/>
+                </a:solidFill>
+                <a:effectLst/>
+                <a:uLnTx/>
+                <a:uFillTx/>
+                <a:latin typeface="Arial"/>
+                <a:ea typeface="+mn-ea"/>
+                <a:cs typeface="+mn-cs"/>
+                <a:hlinkClick r:id="rId7"/>
+              </a:rPr>
+              <a:t>Github</a:t>
+            </a:r>
+            <a:r>
+              <a:rPr kumimoji="0" lang="en-US" sz="900" b="0" i="1" u="none" strike="noStrike" kern="1200" cap="none" spc="0" normalizeH="0" baseline="0" noProof="0" dirty="0">
+                <a:ln>
+                  <a:noFill/>
+                </a:ln>
+                <a:solidFill>
+                  <a:srgbClr val="000000"/>
+                </a:solidFill>
+                <a:effectLst/>
+                <a:uLnTx/>
+                <a:uFillTx/>
+                <a:latin typeface="Arial"/>
+                <a:ea typeface="+mn-ea"/>
+                <a:cs typeface="+mn-cs"/>
+                <a:hlinkClick r:id="rId7"/>
+              </a:rPr>
+              <a:t> of another real life chess vision project</a:t>
+            </a:r>
+            <a:r>
+              <a:rPr kumimoji="0" lang="fr-FR" sz="900" b="0" i="1" u="none" strike="noStrike" kern="1200" cap="none" spc="0" normalizeH="0" baseline="0" noProof="0" dirty="0">
+                <a:ln>
+                  <a:noFill/>
+                </a:ln>
+                <a:solidFill>
+                  <a:srgbClr val="000000"/>
+                </a:solidFill>
+                <a:effectLst/>
+                <a:uLnTx/>
+                <a:uFillTx/>
+                <a:latin typeface="Arial"/>
+                <a:ea typeface="+mn-ea"/>
+                <a:cs typeface="+mn-cs"/>
+              </a:rPr>
+              <a:t> </a:t>
+            </a:r>
+          </a:p>
+        </p:txBody>
+      </p:sp>
+      <p:pic>
+        <p:nvPicPr>
+          <p:cNvPr id="14" name="Picture 13">
+            <a:extLst>
+              <a:ext uri="{FF2B5EF4-FFF2-40B4-BE49-F238E27FC236}">
+                <a16:creationId xmlns:a16="http://schemas.microsoft.com/office/drawing/2014/main" id="{026BB93D-6572-1FED-FCEC-A15D47B93A1A}"/>
+              </a:ext>
+            </a:extLst>
+          </p:cNvPr>
+          <p:cNvPicPr>
+            <a:picLocks noChangeAspect="1"/>
+          </p:cNvPicPr>
+          <p:nvPr/>
+        </p:nvPicPr>
+        <p:blipFill>
+          <a:blip r:embed="rId8"/>
+          <a:stretch>
+            <a:fillRect/>
+          </a:stretch>
+        </p:blipFill>
+        <p:spPr>
+          <a:xfrm>
+            <a:off x="777037" y="1902465"/>
+            <a:ext cx="1713732" cy="1848672"/>
+          </a:xfrm>
+          <a:prstGeom prst="rect">
+            <a:avLst/>
+          </a:prstGeom>
+        </p:spPr>
+      </p:pic>
+      <p:pic>
+        <p:nvPicPr>
+          <p:cNvPr id="9" name="Picture 8">
+            <a:extLst>
+              <a:ext uri="{FF2B5EF4-FFF2-40B4-BE49-F238E27FC236}">
+                <a16:creationId xmlns:a16="http://schemas.microsoft.com/office/drawing/2014/main" id="{8AC03612-1F83-C162-237F-705C17A6ABC1}"/>
+              </a:ext>
+            </a:extLst>
+          </p:cNvPr>
+          <p:cNvPicPr>
+            <a:picLocks noChangeAspect="1"/>
+          </p:cNvPicPr>
+          <p:nvPr/>
+        </p:nvPicPr>
+        <p:blipFill>
+          <a:blip r:embed="rId9"/>
+          <a:stretch>
+            <a:fillRect/>
+          </a:stretch>
+        </p:blipFill>
+        <p:spPr>
+          <a:xfrm>
+            <a:off x="777036" y="4063326"/>
+            <a:ext cx="1713733" cy="1810653"/>
+          </a:xfrm>
+          <a:prstGeom prst="rect">
+            <a:avLst/>
+          </a:prstGeom>
+        </p:spPr>
+      </p:pic>
+      <p:pic>
+        <p:nvPicPr>
+          <p:cNvPr id="12" name="Picture 11">
+            <a:extLst>
+              <a:ext uri="{FF2B5EF4-FFF2-40B4-BE49-F238E27FC236}">
+                <a16:creationId xmlns:a16="http://schemas.microsoft.com/office/drawing/2014/main" id="{A0865535-84E6-1DF2-B78B-078BB8BAD666}"/>
+              </a:ext>
+            </a:extLst>
+          </p:cNvPr>
+          <p:cNvPicPr>
+            <a:picLocks noChangeAspect="1"/>
+          </p:cNvPicPr>
+          <p:nvPr/>
+        </p:nvPicPr>
+        <p:blipFill>
+          <a:blip r:embed="rId10"/>
+          <a:stretch>
+            <a:fillRect/>
+          </a:stretch>
+        </p:blipFill>
+        <p:spPr>
+          <a:xfrm>
+            <a:off x="4656787" y="2271729"/>
+            <a:ext cx="3303065" cy="3522928"/>
+          </a:xfrm>
+          <a:prstGeom prst="rect">
+            <a:avLst/>
+          </a:prstGeom>
+        </p:spPr>
+      </p:pic>
+      <p:sp>
+        <p:nvSpPr>
+          <p:cNvPr id="13" name="TextBox 12">
+            <a:extLst>
+              <a:ext uri="{FF2B5EF4-FFF2-40B4-BE49-F238E27FC236}">
+                <a16:creationId xmlns:a16="http://schemas.microsoft.com/office/drawing/2014/main" id="{562AB436-D0CC-5438-B1C5-B8C1DF45E9A5}"/>
+              </a:ext>
+            </a:extLst>
+          </p:cNvPr>
+          <p:cNvSpPr txBox="1"/>
+          <p:nvPr/>
+        </p:nvSpPr>
+        <p:spPr>
+          <a:xfrm>
+            <a:off x="5220527" y="1922746"/>
+            <a:ext cx="2175584" cy="317898"/>
+          </a:xfrm>
+          <a:prstGeom prst="rect">
+            <a:avLst/>
+          </a:prstGeom>
+          <a:ln w="6350">
+            <a:noFill/>
+            <a:miter lim="800000"/>
+          </a:ln>
+        </p:spPr>
+        <p:txBody>
+          <a:bodyPr vert="horz" wrap="none" lIns="0" tIns="0" rIns="0" bIns="0" rtlCol="0">
+            <a:noAutofit/>
+          </a:bodyPr>
+          <a:lstStyle/>
+          <a:p>
+            <a:pPr algn="l">
+              <a:spcBef>
+                <a:spcPts val="300"/>
+              </a:spcBef>
+              <a:spcAft>
+                <a:spcPts val="300"/>
+              </a:spcAft>
+              <a:buNone/>
+            </a:pPr>
+            <a:r>
+              <a:rPr lang="en-GB" sz="1400" b="1" dirty="0"/>
+              <a:t>Extracted Cells &amp; Pieces</a:t>
+            </a:r>
+          </a:p>
+        </p:txBody>
+      </p:sp>
+      <p:cxnSp>
+        <p:nvCxnSpPr>
+          <p:cNvPr id="17" name="Connector: Elbow 16">
+            <a:extLst>
+              <a:ext uri="{FF2B5EF4-FFF2-40B4-BE49-F238E27FC236}">
+                <a16:creationId xmlns:a16="http://schemas.microsoft.com/office/drawing/2014/main" id="{8F9B4497-9233-9469-DEF5-00FB4BCC4698}"/>
+              </a:ext>
+            </a:extLst>
+          </p:cNvPr>
+          <p:cNvCxnSpPr>
+            <a:stCxn id="14" idx="3"/>
+            <a:endCxn id="12" idx="1"/>
+          </p:cNvCxnSpPr>
+          <p:nvPr/>
+        </p:nvCxnSpPr>
+        <p:spPr>
+          <a:xfrm>
+            <a:off x="2490769" y="2826801"/>
+            <a:ext cx="2166018" cy="1206392"/>
+          </a:xfrm>
+          <a:prstGeom prst="bentConnector3">
+            <a:avLst/>
+          </a:prstGeom>
+          <a:ln w="28575" cap="flat">
+            <a:solidFill>
+              <a:schemeClr val="accent1"/>
+            </a:solidFill>
+            <a:miter lim="800000"/>
+            <a:tailEnd type="triangle"/>
+          </a:ln>
+        </p:spPr>
+        <p:style>
+          <a:lnRef idx="1">
+            <a:schemeClr val="accent1"/>
+          </a:lnRef>
+          <a:fillRef idx="0">
+            <a:schemeClr val="accent1"/>
+          </a:fillRef>
+          <a:effectRef idx="0">
+            <a:schemeClr val="accent1"/>
+          </a:effectRef>
+          <a:fontRef idx="minor">
+            <a:schemeClr val="tx1"/>
+          </a:fontRef>
+        </p:style>
+      </p:cxnSp>
+      <p:cxnSp>
+        <p:nvCxnSpPr>
+          <p:cNvPr id="19" name="Connector: Elbow 18">
+            <a:extLst>
+              <a:ext uri="{FF2B5EF4-FFF2-40B4-BE49-F238E27FC236}">
+                <a16:creationId xmlns:a16="http://schemas.microsoft.com/office/drawing/2014/main" id="{7781B9BA-50F4-684E-0C7B-0BEEBDBFE505}"/>
+              </a:ext>
+            </a:extLst>
+          </p:cNvPr>
+          <p:cNvCxnSpPr>
+            <a:cxnSpLocks/>
+            <a:stCxn id="9" idx="3"/>
+            <a:endCxn id="12" idx="1"/>
+          </p:cNvCxnSpPr>
+          <p:nvPr/>
+        </p:nvCxnSpPr>
+        <p:spPr>
+          <a:xfrm flipV="1">
+            <a:off x="2490769" y="4033193"/>
+            <a:ext cx="2166018" cy="935460"/>
+          </a:xfrm>
+          <a:prstGeom prst="bentConnector3">
+            <a:avLst/>
+          </a:prstGeom>
+          <a:ln w="28575" cap="flat">
+            <a:solidFill>
+              <a:schemeClr val="accent1"/>
+            </a:solidFill>
+            <a:miter lim="800000"/>
+            <a:tailEnd type="triangle"/>
+          </a:ln>
+        </p:spPr>
+        <p:style>
+          <a:lnRef idx="1">
+            <a:schemeClr val="accent1"/>
+          </a:lnRef>
+          <a:fillRef idx="0">
+            <a:schemeClr val="accent1"/>
+          </a:fillRef>
+          <a:effectRef idx="0">
+            <a:schemeClr val="accent1"/>
+          </a:effectRef>
+          <a:fontRef idx="minor">
+            <a:schemeClr val="tx1"/>
+          </a:fontRef>
+        </p:style>
+      </p:cxnSp>
+      <p:pic>
+        <p:nvPicPr>
+          <p:cNvPr id="25" name="Graphic 24" descr="Badge Follow with solid fill">
+            <a:extLst>
+              <a:ext uri="{FF2B5EF4-FFF2-40B4-BE49-F238E27FC236}">
+                <a16:creationId xmlns:a16="http://schemas.microsoft.com/office/drawing/2014/main" id="{7EBC59F0-07C4-8A6D-0428-3EF4F6D4F083}"/>
+              </a:ext>
+            </a:extLst>
+          </p:cNvPr>
+          <p:cNvPicPr>
+            <a:picLocks noChangeAspect="1"/>
+          </p:cNvPicPr>
+          <p:nvPr/>
+        </p:nvPicPr>
+        <p:blipFill>
+          <a:blip r:embed="rId11">
+            <a:extLst>
+              <a:ext uri="{96DAC541-7B7A-43D3-8B79-37D633B846F1}">
+                <asvg:svgBlip xmlns:asvg="http://schemas.microsoft.com/office/drawing/2016/SVG/main" r:embed="rId12"/>
+              </a:ext>
+            </a:extLst>
+          </a:blip>
+          <a:stretch>
+            <a:fillRect/>
+          </a:stretch>
+        </p:blipFill>
+        <p:spPr>
+          <a:xfrm>
+            <a:off x="1434260" y="3690084"/>
+            <a:ext cx="399284" cy="399284"/>
+          </a:xfrm>
+          <a:prstGeom prst="rect">
+            <a:avLst/>
+          </a:prstGeom>
+        </p:spPr>
+      </p:pic>
+      <p:pic>
+        <p:nvPicPr>
+          <p:cNvPr id="26" name="Graphic 25" descr="Gears with solid fill">
+            <a:extLst>
+              <a:ext uri="{FF2B5EF4-FFF2-40B4-BE49-F238E27FC236}">
+                <a16:creationId xmlns:a16="http://schemas.microsoft.com/office/drawing/2014/main" id="{3F825D13-E61F-4C16-A0A5-3AFB05FF6A76}"/>
+              </a:ext>
+            </a:extLst>
+          </p:cNvPr>
+          <p:cNvPicPr>
+            <a:picLocks noChangeAspect="1"/>
+          </p:cNvPicPr>
+          <p:nvPr/>
+        </p:nvPicPr>
+        <p:blipFill>
+          <a:blip r:embed="rId5">
+            <a:extLst>
+              <a:ext uri="{96DAC541-7B7A-43D3-8B79-37D633B846F1}">
+                <asvg:svgBlip xmlns:asvg="http://schemas.microsoft.com/office/drawing/2016/SVG/main" r:embed="rId6"/>
+              </a:ext>
+            </a:extLst>
+          </a:blip>
+          <a:stretch>
+            <a:fillRect/>
+          </a:stretch>
+        </p:blipFill>
+        <p:spPr>
+          <a:xfrm>
+            <a:off x="7539297" y="1733802"/>
+            <a:ext cx="420554" cy="420554"/>
+          </a:xfrm>
+          <a:prstGeom prst="rect">
+            <a:avLst/>
+          </a:prstGeom>
+        </p:spPr>
+      </p:pic>
+      <p:cxnSp>
+        <p:nvCxnSpPr>
+          <p:cNvPr id="31" name="Straight Arrow Connector 30">
+            <a:extLst>
+              <a:ext uri="{FF2B5EF4-FFF2-40B4-BE49-F238E27FC236}">
+                <a16:creationId xmlns:a16="http://schemas.microsoft.com/office/drawing/2014/main" id="{8B012F0F-40FB-E17D-C890-7ECC96963285}"/>
+              </a:ext>
+            </a:extLst>
+          </p:cNvPr>
+          <p:cNvCxnSpPr>
+            <a:cxnSpLocks/>
+            <a:stCxn id="12" idx="3"/>
+          </p:cNvCxnSpPr>
+          <p:nvPr/>
+        </p:nvCxnSpPr>
+        <p:spPr>
+          <a:xfrm>
+            <a:off x="7959852" y="4033193"/>
+            <a:ext cx="1062228" cy="0"/>
+          </a:xfrm>
+          <a:prstGeom prst="straightConnector1">
+            <a:avLst/>
+          </a:prstGeom>
+          <a:ln w="28575" cap="flat">
+            <a:solidFill>
+              <a:schemeClr val="accent1"/>
+            </a:solidFill>
+            <a:miter lim="800000"/>
+            <a:tailEnd type="triangle"/>
+          </a:ln>
+        </p:spPr>
+        <p:style>
+          <a:lnRef idx="1">
+            <a:schemeClr val="accent1"/>
+          </a:lnRef>
+          <a:fillRef idx="0">
+            <a:schemeClr val="accent1"/>
+          </a:fillRef>
+          <a:effectRef idx="0">
+            <a:schemeClr val="accent1"/>
+          </a:effectRef>
+          <a:fontRef idx="minor">
+            <a:schemeClr val="tx1"/>
+          </a:fontRef>
+        </p:style>
+      </p:cxnSp>
+      <p:sp>
+        <p:nvSpPr>
+          <p:cNvPr id="33" name="Rectangle: Rounded Corners 32">
+            <a:extLst>
+              <a:ext uri="{FF2B5EF4-FFF2-40B4-BE49-F238E27FC236}">
+                <a16:creationId xmlns:a16="http://schemas.microsoft.com/office/drawing/2014/main" id="{D5C3C2E2-63A3-B515-92C4-051594C8E07A}"/>
+              </a:ext>
+            </a:extLst>
+          </p:cNvPr>
+          <p:cNvSpPr/>
+          <p:nvPr/>
+        </p:nvSpPr>
+        <p:spPr>
+          <a:xfrm>
+            <a:off x="9022080" y="3652032"/>
+            <a:ext cx="1930400" cy="762322"/>
+          </a:xfrm>
+          <a:prstGeom prst="roundRect">
+            <a:avLst/>
+          </a:prstGeom>
+          <a:solidFill>
+            <a:schemeClr val="accent1"/>
+          </a:solidFill>
+          <a:ln w="6350" cap="sq">
+            <a:noFill/>
+            <a:miter lim="800000"/>
+          </a:ln>
+        </p:spPr>
+        <p:style>
+          <a:lnRef idx="2">
+            <a:schemeClr val="accent1">
+              <a:shade val="50000"/>
+            </a:schemeClr>
+          </a:lnRef>
+          <a:fillRef idx="1">
+            <a:schemeClr val="accent1"/>
+          </a:fillRef>
+          <a:effectRef idx="0">
+            <a:schemeClr val="accent1"/>
+          </a:effectRef>
+          <a:fontRef idx="minor">
+            <a:schemeClr val="lt1"/>
+          </a:fontRef>
+        </p:style>
+        <p:txBody>
+          <a:bodyPr rot="0" spcFirstLastPara="0" vertOverflow="overflow" horzOverflow="overflow" vert="horz" wrap="square" lIns="91440" tIns="45720" rIns="91440" bIns="45720" numCol="1" spcCol="0" rtlCol="0" fromWordArt="0" anchor="ctr" anchorCtr="0" forceAA="0" compatLnSpc="1">
+            <a:prstTxWarp prst="textNoShape">
+              <a:avLst/>
+            </a:prstTxWarp>
+            <a:noAutofit/>
+          </a:bodyPr>
+          <a:lstStyle/>
+          <a:p>
+            <a:pPr algn="ctr">
+              <a:spcBef>
+                <a:spcPts val="300"/>
+              </a:spcBef>
+              <a:spcAft>
+                <a:spcPts val="300"/>
+              </a:spcAft>
+            </a:pPr>
+            <a:r>
+              <a:rPr lang="en-GB" sz="1600" b="1" dirty="0">
+                <a:solidFill>
+                  <a:schemeClr val="bg1"/>
+                </a:solidFill>
+              </a:rPr>
+              <a:t>Manual classification</a:t>
+            </a:r>
+          </a:p>
+        </p:txBody>
+      </p:sp>
+    </p:spTree>
+    <p:extLst>
+      <p:ext uri="{BB962C8B-B14F-4D97-AF65-F5344CB8AC3E}">
+        <p14:creationId xmlns:p14="http://schemas.microsoft.com/office/powerpoint/2010/main" val="2612095775"/>
+      </p:ext>
+    </p:extLst>
+  </p:cSld>
+  <p:clrMapOvr>
+    <a:masterClrMapping/>
+  </p:clrMapOvr>
+</p:sld>
+</file>
+
 <file path=ppt/tags/tag1.xml><?xml version="1.0" encoding="utf-8"?>
 <p:tagLst xmlns:a="http://schemas.openxmlformats.org/drawingml/2006/main" xmlns:r="http://schemas.openxmlformats.org/officeDocument/2006/relationships" xmlns:p="http://schemas.openxmlformats.org/presentationml/2006/main">
   <p:tag name="THINKCELLSHAPEDONOTDELETE" val="thinkcellActiveDocDoNotDelete"/>
@@ -24780,6 +25617,12 @@
 </file>
 
 <file path=ppt/tags/tag142.xml><?xml version="1.0" encoding="utf-8"?>
+<p:tagLst xmlns:a="http://schemas.openxmlformats.org/drawingml/2006/main" xmlns:r="http://schemas.openxmlformats.org/officeDocument/2006/relationships" xmlns:p="http://schemas.openxmlformats.org/presentationml/2006/main">
+  <p:tag name="THINKCELLSHAPEDONOTDELETE" val="thinkcellActiveDocDoNotDelete"/>
+</p:tagLst>
+</file>
+
+<file path=ppt/tags/tag143.xml><?xml version="1.0" encoding="utf-8"?>
 <p:tagLst xmlns:a="http://schemas.openxmlformats.org/drawingml/2006/main" xmlns:r="http://schemas.openxmlformats.org/officeDocument/2006/relationships" xmlns:p="http://schemas.openxmlformats.org/presentationml/2006/main">
   <p:tag name="THINKCELLSHAPEDONOTDELETE" val="thinkcellActiveDocDoNotDelete"/>
 </p:tagLst>

</xml_diff>